<commit_message>
Diagram of completed fish, update briefing
</commit_message>
<xml_diff>
--- a/Briefings/Briefing8.pptx
+++ b/Briefings/Briefing8.pptx
@@ -11,9 +11,10 @@
     <p:sldId id="260" r:id="rId5"/>
     <p:sldId id="263" r:id="rId6"/>
     <p:sldId id="262" r:id="rId7"/>
-    <p:sldId id="264" r:id="rId8"/>
-    <p:sldId id="259" r:id="rId9"/>
-    <p:sldId id="257" r:id="rId10"/>
+    <p:sldId id="265" r:id="rId8"/>
+    <p:sldId id="264" r:id="rId9"/>
+    <p:sldId id="259" r:id="rId10"/>
+    <p:sldId id="257" r:id="rId11"/>
   </p:sldIdLst>
   <p:sldSz cx="9144000" cy="6858000" type="screen4x3"/>
   <p:notesSz cx="6858000" cy="9144000"/>
@@ -323,7 +324,7 @@
             <a:fld id="{542ED6D8-967B-4FDD-8539-23116DD8CE38}" type="datetimeFigureOut">
               <a:rPr lang="en-US" smtClean="0"/>
               <a:pPr/>
-              <a:t>1/31/2015</a:t>
+              <a:t>2/1/2015</a:t>
             </a:fld>
             <a:endParaRPr lang="en-US"/>
           </a:p>
@@ -519,7 +520,7 @@
             <a:fld id="{542ED6D8-967B-4FDD-8539-23116DD8CE38}" type="datetimeFigureOut">
               <a:rPr lang="en-US" smtClean="0"/>
               <a:pPr/>
-              <a:t>1/31/2015</a:t>
+              <a:t>2/1/2015</a:t>
             </a:fld>
             <a:endParaRPr lang="en-US"/>
           </a:p>
@@ -709,7 +710,7 @@
             <a:fld id="{542ED6D8-967B-4FDD-8539-23116DD8CE38}" type="datetimeFigureOut">
               <a:rPr lang="en-US" smtClean="0"/>
               <a:pPr/>
-              <a:t>1/31/2015</a:t>
+              <a:t>2/1/2015</a:t>
             </a:fld>
             <a:endParaRPr lang="en-US"/>
           </a:p>
@@ -940,7 +941,7 @@
             <a:fld id="{542ED6D8-967B-4FDD-8539-23116DD8CE38}" type="datetimeFigureOut">
               <a:rPr lang="en-US" smtClean="0"/>
               <a:pPr/>
-              <a:t>1/31/2015</a:t>
+              <a:t>2/1/2015</a:t>
             </a:fld>
             <a:endParaRPr lang="en-US"/>
           </a:p>
@@ -1223,7 +1224,7 @@
             <a:fld id="{542ED6D8-967B-4FDD-8539-23116DD8CE38}" type="datetimeFigureOut">
               <a:rPr lang="en-US" smtClean="0"/>
               <a:pPr/>
-              <a:t>1/31/2015</a:t>
+              <a:t>2/1/2015</a:t>
             </a:fld>
             <a:endParaRPr lang="en-US"/>
           </a:p>
@@ -1513,7 +1514,7 @@
             <a:fld id="{542ED6D8-967B-4FDD-8539-23116DD8CE38}" type="datetimeFigureOut">
               <a:rPr lang="en-US" smtClean="0"/>
               <a:pPr/>
-              <a:t>1/31/2015</a:t>
+              <a:t>2/1/2015</a:t>
             </a:fld>
             <a:endParaRPr lang="en-US"/>
           </a:p>
@@ -2069,7 +2070,7 @@
             <a:fld id="{542ED6D8-967B-4FDD-8539-23116DD8CE38}" type="datetimeFigureOut">
               <a:rPr lang="en-US" smtClean="0"/>
               <a:pPr/>
-              <a:t>1/31/2015</a:t>
+              <a:t>2/1/2015</a:t>
             </a:fld>
             <a:endParaRPr lang="en-US"/>
           </a:p>
@@ -2202,7 +2203,7 @@
             <a:fld id="{542ED6D8-967B-4FDD-8539-23116DD8CE38}" type="datetimeFigureOut">
               <a:rPr lang="en-US" smtClean="0"/>
               <a:pPr/>
-              <a:t>1/31/2015</a:t>
+              <a:t>2/1/2015</a:t>
             </a:fld>
             <a:endParaRPr lang="en-US"/>
           </a:p>
@@ -2354,7 +2355,7 @@
             <a:fld id="{542ED6D8-967B-4FDD-8539-23116DD8CE38}" type="datetimeFigureOut">
               <a:rPr lang="en-US" smtClean="0"/>
               <a:pPr/>
-              <a:t>1/31/2015</a:t>
+              <a:t>2/1/2015</a:t>
             </a:fld>
             <a:endParaRPr lang="en-US"/>
           </a:p>
@@ -2677,7 +2678,7 @@
             <a:fld id="{542ED6D8-967B-4FDD-8539-23116DD8CE38}" type="datetimeFigureOut">
               <a:rPr lang="en-US" smtClean="0"/>
               <a:pPr/>
-              <a:t>1/31/2015</a:t>
+              <a:t>2/1/2015</a:t>
             </a:fld>
             <a:endParaRPr lang="en-US"/>
           </a:p>
@@ -2976,7 +2977,7 @@
             <a:fld id="{542ED6D8-967B-4FDD-8539-23116DD8CE38}" type="datetimeFigureOut">
               <a:rPr lang="en-US" smtClean="0"/>
               <a:pPr/>
-              <a:t>1/31/2015</a:t>
+              <a:t>2/1/2015</a:t>
             </a:fld>
             <a:endParaRPr lang="en-US"/>
           </a:p>
@@ -3223,7 +3224,7 @@
             <a:fld id="{542ED6D8-967B-4FDD-8539-23116DD8CE38}" type="datetimeFigureOut">
               <a:rPr lang="en-US" smtClean="0"/>
               <a:pPr/>
-              <a:t>1/31/2015</a:t>
+              <a:t>2/1/2015</a:t>
             </a:fld>
             <a:endParaRPr lang="en-US"/>
           </a:p>
@@ -3814,6 +3815,80 @@
 </p:sld>
 </file>
 
+<file path=ppt/slides/slide10.xml><?xml version="1.0" encoding="utf-8"?>
+<p:sld xmlns:a="http://schemas.openxmlformats.org/drawingml/2006/main" xmlns:r="http://schemas.openxmlformats.org/officeDocument/2006/relationships" xmlns:p="http://schemas.openxmlformats.org/presentationml/2006/main">
+  <p:cSld>
+    <p:spTree>
+      <p:nvGrpSpPr>
+        <p:cNvPr id="1" name=""/>
+        <p:cNvGrpSpPr/>
+        <p:nvPr/>
+      </p:nvGrpSpPr>
+      <p:grpSpPr>
+        <a:xfrm>
+          <a:off x="0" y="0"/>
+          <a:ext cx="0" cy="0"/>
+          <a:chOff x="0" y="0"/>
+          <a:chExt cx="0" cy="0"/>
+        </a:xfrm>
+      </p:grpSpPr>
+      <p:sp>
+        <p:nvSpPr>
+          <p:cNvPr id="2" name="Title 1"/>
+          <p:cNvSpPr>
+            <a:spLocks noGrp="1"/>
+          </p:cNvSpPr>
+          <p:nvPr>
+            <p:ph type="title"/>
+          </p:nvPr>
+        </p:nvSpPr>
+        <p:spPr/>
+        <p:txBody>
+          <a:bodyPr>
+            <a:normAutofit fontScale="90000"/>
+          </a:bodyPr>
+          <a:lstStyle/>
+          <a:p>
+            <a:pPr algn="ctr"/>
+            <a:r>
+              <a:rPr lang="en-US" dirty="0" smtClean="0"/>
+              <a:t>Where We’re Going (Long Term)</a:t>
+            </a:r>
+            <a:endParaRPr lang="en-US" dirty="0"/>
+          </a:p>
+        </p:txBody>
+      </p:sp>
+      <p:pic>
+        <p:nvPicPr>
+          <p:cNvPr id="4" name="Content Placeholder 3" descr="EstimatedTimeline.png"/>
+          <p:cNvPicPr>
+            <a:picLocks noGrp="1" noChangeAspect="1"/>
+          </p:cNvPicPr>
+          <p:nvPr>
+            <p:ph idx="1"/>
+          </p:nvPr>
+        </p:nvPicPr>
+        <p:blipFill>
+          <a:blip r:embed="rId2" cstate="print"/>
+          <a:stretch>
+            <a:fillRect/>
+          </a:stretch>
+        </p:blipFill>
+        <p:spPr>
+          <a:xfrm>
+            <a:off x="0" y="2895600"/>
+            <a:ext cx="9144000" cy="2286000"/>
+          </a:xfrm>
+        </p:spPr>
+      </p:pic>
+    </p:spTree>
+  </p:cSld>
+  <p:clrMapOvr>
+    <a:masterClrMapping/>
+  </p:clrMapOvr>
+</p:sld>
+</file>
+
 <file path=ppt/slides/slide2.xml><?xml version="1.0" encoding="utf-8"?>
 <p:sld xmlns:a="http://schemas.openxmlformats.org/drawingml/2006/main" xmlns:r="http://schemas.openxmlformats.org/officeDocument/2006/relationships" xmlns:p="http://schemas.openxmlformats.org/presentationml/2006/main">
   <p:cSld>
@@ -4296,14 +4371,66 @@
             <a:pPr lvl="1"/>
             <a:r>
               <a:rPr lang="en-US" dirty="0" smtClean="0"/>
-              <a:t>Can’t guarantee input for length/weight</a:t>
-            </a:r>
-          </a:p>
-          <a:p>
+              <a:t>Can’t guarantee input for </a:t>
+            </a:r>
+            <a:r>
+              <a:rPr lang="en-US" dirty="0" smtClean="0"/>
+              <a:t>fields</a:t>
+            </a:r>
+          </a:p>
+          <a:p>
+            <a:pPr lvl="2"/>
+            <a:r>
+              <a:rPr lang="en-US" dirty="0" smtClean="0"/>
+              <a:t>Length</a:t>
+            </a:r>
+          </a:p>
+          <a:p>
+            <a:pPr lvl="2"/>
+            <a:r>
+              <a:rPr lang="en-US" dirty="0" smtClean="0"/>
+              <a:t>Weight</a:t>
+            </a:r>
+          </a:p>
+          <a:p>
+            <a:pPr lvl="2"/>
+            <a:r>
+              <a:rPr lang="en-US" dirty="0" smtClean="0"/>
+              <a:t>Fin clip</a:t>
+            </a:r>
             <a:endParaRPr lang="en-US" dirty="0" smtClean="0"/>
           </a:p>
-        </p:txBody>
-      </p:sp>
+          <a:p>
+            <a:endParaRPr lang="en-US" dirty="0" smtClean="0"/>
+          </a:p>
+        </p:txBody>
+      </p:sp>
+      <p:pic>
+        <p:nvPicPr>
+          <p:cNvPr id="4" name="Picture 2" descr="https://openclipart.org/image/300px/svg_to_png/2679/Machovka-pikeperch.png"/>
+          <p:cNvPicPr>
+            <a:picLocks noChangeAspect="1" noChangeArrowheads="1"/>
+          </p:cNvPicPr>
+          <p:nvPr/>
+        </p:nvPicPr>
+        <p:blipFill>
+          <a:blip r:embed="rId2" cstate="print"/>
+          <a:srcRect/>
+          <a:stretch>
+            <a:fillRect/>
+          </a:stretch>
+        </p:blipFill>
+        <p:spPr bwMode="auto">
+          <a:xfrm>
+            <a:off x="2383975" y="4267200"/>
+            <a:ext cx="4245425" cy="1981200"/>
+          </a:xfrm>
+          <a:prstGeom prst="rect">
+            <a:avLst/>
+          </a:prstGeom>
+          <a:noFill/>
+        </p:spPr>
+      </p:pic>
     </p:spTree>
   </p:cSld>
   <p:clrMapOvr>
@@ -4347,38 +4474,121 @@
             <a:pPr algn="ctr"/>
             <a:r>
               <a:rPr lang="en-US" dirty="0" smtClean="0"/>
-              <a:t>CSV Output</a:t>
+              <a:t>Completed Fish Diagrams</a:t>
             </a:r>
             <a:endParaRPr lang="en-US" dirty="0"/>
           </a:p>
         </p:txBody>
       </p:sp>
-      <p:sp>
-        <p:nvSpPr>
-          <p:cNvPr id="3" name="Content Placeholder 2"/>
-          <p:cNvSpPr>
-            <a:spLocks noGrp="1"/>
-          </p:cNvSpPr>
-          <p:nvPr>
-            <p:ph idx="1"/>
-          </p:nvPr>
-        </p:nvSpPr>
-        <p:spPr/>
-        <p:txBody>
-          <a:bodyPr/>
+      <p:pic>
+        <p:nvPicPr>
+          <p:cNvPr id="7" name="Content Placeholder 6" descr="ButtonFlowDiagram.png"/>
+          <p:cNvPicPr>
+            <a:picLocks noGrp="1" noChangeAspect="1"/>
+          </p:cNvPicPr>
+          <p:nvPr>
+            <p:ph sz="quarter" idx="2"/>
+          </p:nvPr>
+        </p:nvPicPr>
+        <p:blipFill>
+          <a:blip r:embed="rId2" cstate="print"/>
+          <a:stretch>
+            <a:fillRect/>
+          </a:stretch>
+        </p:blipFill>
+        <p:spPr>
+          <a:xfrm>
+            <a:off x="914400" y="1447800"/>
+            <a:ext cx="3352800" cy="5410200"/>
+          </a:xfrm>
+        </p:spPr>
+      </p:pic>
+      <p:pic>
+        <p:nvPicPr>
+          <p:cNvPr id="8" name="Content Placeholder 7" descr="CompletedFish2_1.png"/>
+          <p:cNvPicPr>
+            <a:picLocks noGrp="1" noChangeAspect="1"/>
+          </p:cNvPicPr>
+          <p:nvPr>
+            <p:ph sz="quarter" idx="4"/>
+          </p:nvPr>
+        </p:nvPicPr>
+        <p:blipFill>
+          <a:blip r:embed="rId3" cstate="print"/>
+          <a:stretch>
+            <a:fillRect/>
+          </a:stretch>
+        </p:blipFill>
+        <p:spPr>
+          <a:xfrm>
+            <a:off x="5334000" y="1447800"/>
+            <a:ext cx="2880033" cy="5410200"/>
+          </a:xfrm>
+        </p:spPr>
+      </p:pic>
+      <p:sp>
+        <p:nvSpPr>
+          <p:cNvPr id="9" name="TextBox 8"/>
+          <p:cNvSpPr txBox="1"/>
+          <p:nvPr/>
+        </p:nvSpPr>
+        <p:spPr>
+          <a:xfrm>
+            <a:off x="304800" y="1409701"/>
+            <a:ext cx="663387" cy="5410200"/>
+          </a:xfrm>
+          <a:prstGeom prst="rect">
+            <a:avLst/>
+          </a:prstGeom>
+          <a:noFill/>
+        </p:spPr>
+        <p:txBody>
+          <a:bodyPr vert="wordArtVert" wrap="square" rtlCol="0">
+            <a:spAutoFit/>
+          </a:bodyPr>
           <a:lstStyle/>
           <a:p>
             <a:r>
+              <a:rPr lang="en-US" sz="3200" dirty="0" smtClean="0"/>
+              <a:t>Old Diagram</a:t>
+            </a:r>
+            <a:endParaRPr lang="en-US" sz="3200" dirty="0"/>
+          </a:p>
+        </p:txBody>
+      </p:sp>
+      <p:sp>
+        <p:nvSpPr>
+          <p:cNvPr id="10" name="Rectangle 9"/>
+          <p:cNvSpPr/>
+          <p:nvPr/>
+        </p:nvSpPr>
+        <p:spPr>
+          <a:xfrm>
+            <a:off x="4746813" y="1371601"/>
+            <a:ext cx="663387" cy="5486400"/>
+          </a:xfrm>
+          <a:prstGeom prst="rect">
+            <a:avLst/>
+          </a:prstGeom>
+        </p:spPr>
+        <p:txBody>
+          <a:bodyPr vert="wordArtVert" wrap="square">
+            <a:spAutoFit/>
+          </a:bodyPr>
+          <a:lstStyle/>
+          <a:p>
+            <a:r>
+              <a:rPr lang="en-US" sz="3200" dirty="0" smtClean="0"/>
+              <a:t>New</a:t>
+            </a:r>
+            <a:r>
               <a:rPr lang="en-US" dirty="0" smtClean="0"/>
-              <a:t>Must match current format for use in another program</a:t>
-            </a:r>
-          </a:p>
-          <a:p>
-            <a:r>
-              <a:rPr lang="en-US" dirty="0" smtClean="0"/>
-              <a:t>Lower priority than the JSON output</a:t>
-            </a:r>
-            <a:endParaRPr lang="en-US" dirty="0"/>
+              <a:t> </a:t>
+            </a:r>
+            <a:r>
+              <a:rPr lang="en-US" sz="3200" dirty="0" smtClean="0"/>
+              <a:t>Diagram</a:t>
+            </a:r>
           </a:p>
         </p:txBody>
       </p:sp>
@@ -4419,91 +4629,84 @@
         </p:nvSpPr>
         <p:spPr/>
         <p:txBody>
-          <a:bodyPr>
-            <a:normAutofit fontScale="90000"/>
-          </a:bodyPr>
-          <a:lstStyle/>
-          <a:p>
-            <a:r>
-              <a:rPr lang="en-US" dirty="0" smtClean="0"/>
-              <a:t>Where We’re Going (Short Term)</a:t>
-            </a:r>
-            <a:endParaRPr lang="en-US" dirty="0"/>
-          </a:p>
-        </p:txBody>
-      </p:sp>
-      <p:sp>
-        <p:nvSpPr>
-          <p:cNvPr id="3" name="Content Placeholder 2"/>
-          <p:cNvSpPr>
-            <a:spLocks noGrp="1"/>
-          </p:cNvSpPr>
-          <p:nvPr>
-            <p:ph idx="1"/>
-          </p:nvPr>
-        </p:nvSpPr>
-        <p:spPr/>
-        <p:txBody>
           <a:bodyPr/>
           <a:lstStyle/>
           <a:p>
+            <a:pPr algn="ctr"/>
             <a:r>
               <a:rPr lang="en-US" dirty="0" smtClean="0"/>
-              <a:t>Test the UI</a:t>
-            </a:r>
-          </a:p>
-          <a:p>
-            <a:pPr lvl="1"/>
+              <a:t>CSV Output</a:t>
+            </a:r>
+            <a:endParaRPr lang="en-US" dirty="0"/>
+          </a:p>
+        </p:txBody>
+      </p:sp>
+      <p:sp>
+        <p:nvSpPr>
+          <p:cNvPr id="3" name="Content Placeholder 2"/>
+          <p:cNvSpPr>
+            <a:spLocks noGrp="1"/>
+          </p:cNvSpPr>
+          <p:nvPr>
+            <p:ph idx="1"/>
+          </p:nvPr>
+        </p:nvSpPr>
+        <p:spPr/>
+        <p:txBody>
+          <a:bodyPr/>
+          <a:lstStyle/>
+          <a:p>
             <a:r>
               <a:rPr lang="en-US" dirty="0" smtClean="0"/>
-              <a:t>Functionality</a:t>
-            </a:r>
-          </a:p>
-          <a:p>
-            <a:pPr lvl="1"/>
+              <a:t>Must match current format for use in another program</a:t>
+            </a:r>
+          </a:p>
+          <a:p>
             <a:r>
               <a:rPr lang="en-US" dirty="0" smtClean="0"/>
-              <a:t>Layout</a:t>
-            </a:r>
-          </a:p>
-          <a:p>
-            <a:r>
-              <a:rPr lang="en-US" dirty="0" smtClean="0"/>
-              <a:t>Finish up the UI </a:t>
-            </a:r>
-          </a:p>
-          <a:p>
-            <a:pPr lvl="1"/>
-            <a:r>
-              <a:rPr lang="en-US" dirty="0" smtClean="0"/>
-              <a:t>Client changes</a:t>
-            </a:r>
-          </a:p>
-          <a:p>
-            <a:pPr lvl="1"/>
-            <a:r>
-              <a:rPr lang="en-US" dirty="0" smtClean="0"/>
-              <a:t>Work flow</a:t>
-            </a:r>
-          </a:p>
-          <a:p>
-            <a:pPr lvl="1"/>
-            <a:r>
-              <a:rPr lang="en-US" dirty="0" smtClean="0"/>
-              <a:t>Underlying objects</a:t>
-            </a:r>
-          </a:p>
-          <a:p>
-            <a:r>
-              <a:rPr lang="en-US" dirty="0" smtClean="0"/>
-              <a:t>Continue work on JSON/CSV</a:t>
-            </a:r>
-          </a:p>
-          <a:p>
+              <a:t>Lower priority than the JSON output</a:t>
+            </a:r>
             <a:endParaRPr lang="en-US" dirty="0"/>
           </a:p>
         </p:txBody>
       </p:sp>
+      <p:pic>
+        <p:nvPicPr>
+          <p:cNvPr id="4100" name="Picture 4" descr="https://openclipart.org/image/300px/svg_to_png/716/ryanlerch-Pink-Salmon.png"/>
+          <p:cNvPicPr>
+            <a:picLocks noChangeAspect="1" noChangeArrowheads="1"/>
+          </p:cNvPicPr>
+          <p:nvPr/>
+        </p:nvPicPr>
+        <p:blipFill>
+          <a:blip r:embed="rId2" cstate="print"/>
+          <a:srcRect/>
+          <a:stretch>
+            <a:fillRect/>
+          </a:stretch>
+        </p:blipFill>
+        <p:spPr bwMode="auto">
+          <a:xfrm>
+            <a:off x="2696060" y="4133850"/>
+            <a:ext cx="3751881" cy="1581150"/>
+          </a:xfrm>
+          <a:prstGeom prst="rect">
+            <a:avLst/>
+          </a:prstGeom>
+          <a:ln w="88900" cap="sq" cmpd="thickThin">
+            <a:solidFill>
+              <a:srgbClr val="000000"/>
+            </a:solidFill>
+            <a:prstDash val="solid"/>
+            <a:miter lim="800000"/>
+          </a:ln>
+          <a:effectLst>
+            <a:innerShdw blurRad="76200">
+              <a:srgbClr val="000000"/>
+            </a:innerShdw>
+          </a:effectLst>
+        </p:spPr>
+      </p:pic>
     </p:spTree>
   </p:cSld>
   <p:clrMapOvr>
@@ -4546,38 +4749,86 @@
           </a:bodyPr>
           <a:lstStyle/>
           <a:p>
-            <a:pPr algn="ctr"/>
             <a:r>
               <a:rPr lang="en-US" dirty="0" smtClean="0"/>
-              <a:t>Where We’re Going (Long Term)</a:t>
+              <a:t>Where We’re Going (Short Term)</a:t>
             </a:r>
             <a:endParaRPr lang="en-US" dirty="0"/>
           </a:p>
         </p:txBody>
       </p:sp>
-      <p:pic>
-        <p:nvPicPr>
-          <p:cNvPr id="4" name="Content Placeholder 3" descr="EstimatedTimeline.png"/>
-          <p:cNvPicPr>
-            <a:picLocks noGrp="1" noChangeAspect="1"/>
-          </p:cNvPicPr>
+      <p:sp>
+        <p:nvSpPr>
+          <p:cNvPr id="3" name="Content Placeholder 2"/>
+          <p:cNvSpPr>
+            <a:spLocks noGrp="1"/>
+          </p:cNvSpPr>
           <p:nvPr>
             <p:ph idx="1"/>
           </p:nvPr>
-        </p:nvPicPr>
-        <p:blipFill>
-          <a:blip r:embed="rId2" cstate="print"/>
-          <a:stretch>
-            <a:fillRect/>
-          </a:stretch>
-        </p:blipFill>
-        <p:spPr>
-          <a:xfrm>
-            <a:off x="0" y="2895600"/>
-            <a:ext cx="9144000" cy="2286000"/>
-          </a:xfrm>
-        </p:spPr>
-      </p:pic>
+        </p:nvSpPr>
+        <p:spPr/>
+        <p:txBody>
+          <a:bodyPr/>
+          <a:lstStyle/>
+          <a:p>
+            <a:r>
+              <a:rPr lang="en-US" dirty="0" smtClean="0"/>
+              <a:t>Test the UI</a:t>
+            </a:r>
+          </a:p>
+          <a:p>
+            <a:pPr lvl="1"/>
+            <a:r>
+              <a:rPr lang="en-US" dirty="0" smtClean="0"/>
+              <a:t>Functionality</a:t>
+            </a:r>
+          </a:p>
+          <a:p>
+            <a:pPr lvl="1"/>
+            <a:r>
+              <a:rPr lang="en-US" dirty="0" smtClean="0"/>
+              <a:t>Layout</a:t>
+            </a:r>
+          </a:p>
+          <a:p>
+            <a:r>
+              <a:rPr lang="en-US" dirty="0" smtClean="0"/>
+              <a:t>Finish up the UI </a:t>
+            </a:r>
+          </a:p>
+          <a:p>
+            <a:pPr lvl="1"/>
+            <a:r>
+              <a:rPr lang="en-US" dirty="0" smtClean="0"/>
+              <a:t>Client changes</a:t>
+            </a:r>
+          </a:p>
+          <a:p>
+            <a:pPr lvl="1"/>
+            <a:r>
+              <a:rPr lang="en-US" dirty="0" smtClean="0"/>
+              <a:t>Work flow</a:t>
+            </a:r>
+          </a:p>
+          <a:p>
+            <a:pPr lvl="1"/>
+            <a:r>
+              <a:rPr lang="en-US" dirty="0" smtClean="0"/>
+              <a:t>Underlying objects</a:t>
+            </a:r>
+          </a:p>
+          <a:p>
+            <a:r>
+              <a:rPr lang="en-US" dirty="0" smtClean="0"/>
+              <a:t>Continue work on JSON/CSV</a:t>
+            </a:r>
+          </a:p>
+          <a:p>
+            <a:endParaRPr lang="en-US" dirty="0"/>
+          </a:p>
+        </p:txBody>
+      </p:sp>
     </p:spTree>
   </p:cSld>
   <p:clrMapOvr>

</xml_diff>